<commit_message>
Add db lesson 1 ppt
</commit_message>
<xml_diff>
--- a/3D graphics/SIM/lesson 1/Workshop1.pptx
+++ b/3D graphics/SIM/lesson 1/Workshop1.pptx
@@ -321,7 +321,7 @@
           <a:p>
             <a:fld id="{AA70F276-1833-4A75-9C1D-A56E2295A68D}" type="datetimeFigureOut">
               <a:rPr lang="en-US" smtClean="0"/>
-              <a:t>10/13/21</a:t>
+              <a:t>10/17/2022</a:t>
             </a:fld>
             <a:endParaRPr lang="en-US"/>
           </a:p>
@@ -597,7 +597,7 @@
             <a:fld id="{AA70F276-1833-4A75-9C1D-A56E2295A68D}" type="datetimeFigureOut">
               <a:rPr lang="en-US" smtClean="0"/>
               <a:pPr/>
-              <a:t>10/13/21</a:t>
+              <a:t>10/17/2022</a:t>
             </a:fld>
             <a:endParaRPr lang="en-US" dirty="0"/>
           </a:p>
@@ -797,7 +797,7 @@
             <a:fld id="{AA70F276-1833-4A75-9C1D-A56E2295A68D}" type="datetimeFigureOut">
               <a:rPr lang="en-US" smtClean="0"/>
               <a:pPr/>
-              <a:t>10/13/21</a:t>
+              <a:t>10/17/2022</a:t>
             </a:fld>
             <a:endParaRPr lang="en-US" dirty="0"/>
           </a:p>
@@ -1071,7 +1071,7 @@
             <a:fld id="{AA70F276-1833-4A75-9C1D-A56E2295A68D}" type="datetimeFigureOut">
               <a:rPr lang="en-US" smtClean="0"/>
               <a:pPr/>
-              <a:t>10/13/21</a:t>
+              <a:t>10/17/2022</a:t>
             </a:fld>
             <a:endParaRPr lang="en-US" dirty="0"/>
           </a:p>
@@ -1409,7 +1409,7 @@
             <a:fld id="{AA70F276-1833-4A75-9C1D-A56E2295A68D}" type="datetimeFigureOut">
               <a:rPr lang="en-US" smtClean="0"/>
               <a:pPr/>
-              <a:t>10/13/21</a:t>
+              <a:t>10/17/2022</a:t>
             </a:fld>
             <a:endParaRPr lang="en-US" dirty="0"/>
           </a:p>
@@ -2025,7 +2025,7 @@
             <a:fld id="{AA70F276-1833-4A75-9C1D-A56E2295A68D}" type="datetimeFigureOut">
               <a:rPr lang="en-US" smtClean="0"/>
               <a:pPr/>
-              <a:t>10/13/21</a:t>
+              <a:t>10/17/2022</a:t>
             </a:fld>
             <a:endParaRPr lang="en-US" dirty="0"/>
           </a:p>
@@ -2878,7 +2878,7 @@
             <a:fld id="{AA70F276-1833-4A75-9C1D-A56E2295A68D}" type="datetimeFigureOut">
               <a:rPr lang="en-US" smtClean="0"/>
               <a:pPr/>
-              <a:t>10/13/21</a:t>
+              <a:t>10/17/2022</a:t>
             </a:fld>
             <a:endParaRPr lang="en-US" dirty="0"/>
           </a:p>
@@ -3053,7 +3053,7 @@
           <a:p>
             <a:fld id="{AA70F276-1833-4A75-9C1D-A56E2295A68D}" type="datetimeFigureOut">
               <a:rPr lang="en-US" smtClean="0"/>
-              <a:t>10/13/21</a:t>
+              <a:t>10/17/2022</a:t>
             </a:fld>
             <a:endParaRPr lang="en-US"/>
           </a:p>
@@ -3233,7 +3233,7 @@
           <a:p>
             <a:fld id="{AA70F276-1833-4A75-9C1D-A56E2295A68D}" type="datetimeFigureOut">
               <a:rPr lang="en-US" smtClean="0"/>
-              <a:t>10/13/21</a:t>
+              <a:t>10/17/2022</a:t>
             </a:fld>
             <a:endParaRPr lang="en-US"/>
           </a:p>
@@ -3403,7 +3403,7 @@
           <a:p>
             <a:fld id="{AA70F276-1833-4A75-9C1D-A56E2295A68D}" type="datetimeFigureOut">
               <a:rPr lang="en-US" smtClean="0"/>
-              <a:t>10/13/21</a:t>
+              <a:t>10/17/2022</a:t>
             </a:fld>
             <a:endParaRPr lang="en-US"/>
           </a:p>
@@ -3647,7 +3647,7 @@
           <a:p>
             <a:fld id="{AA70F276-1833-4A75-9C1D-A56E2295A68D}" type="datetimeFigureOut">
               <a:rPr lang="en-US" smtClean="0"/>
-              <a:t>10/13/21</a:t>
+              <a:t>10/17/2022</a:t>
             </a:fld>
             <a:endParaRPr lang="en-US"/>
           </a:p>
@@ -3939,7 +3939,7 @@
           <a:p>
             <a:fld id="{AA70F276-1833-4A75-9C1D-A56E2295A68D}" type="datetimeFigureOut">
               <a:rPr lang="en-US" smtClean="0"/>
-              <a:t>10/13/21</a:t>
+              <a:t>10/17/2022</a:t>
             </a:fld>
             <a:endParaRPr lang="en-US"/>
           </a:p>
@@ -4378,7 +4378,7 @@
             <a:fld id="{AA70F276-1833-4A75-9C1D-A56E2295A68D}" type="datetimeFigureOut">
               <a:rPr lang="en-US" smtClean="0"/>
               <a:pPr/>
-              <a:t>10/13/21</a:t>
+              <a:t>10/17/2022</a:t>
             </a:fld>
             <a:endParaRPr lang="en-US" dirty="0"/>
           </a:p>
@@ -4501,7 +4501,7 @@
           <a:p>
             <a:fld id="{AA70F276-1833-4A75-9C1D-A56E2295A68D}" type="datetimeFigureOut">
               <a:rPr lang="en-US" smtClean="0"/>
-              <a:t>10/13/21</a:t>
+              <a:t>10/17/2022</a:t>
             </a:fld>
             <a:endParaRPr lang="en-US"/>
           </a:p>
@@ -4596,7 +4596,7 @@
           <a:p>
             <a:fld id="{AA70F276-1833-4A75-9C1D-A56E2295A68D}" type="datetimeFigureOut">
               <a:rPr lang="en-US" smtClean="0"/>
-              <a:t>10/13/21</a:t>
+              <a:t>10/17/2022</a:t>
             </a:fld>
             <a:endParaRPr lang="en-US"/>
           </a:p>
@@ -4875,7 +4875,7 @@
           <a:p>
             <a:fld id="{AA70F276-1833-4A75-9C1D-A56E2295A68D}" type="datetimeFigureOut">
               <a:rPr lang="en-US" smtClean="0"/>
-              <a:t>10/13/21</a:t>
+              <a:t>10/17/2022</a:t>
             </a:fld>
             <a:endParaRPr lang="en-US"/>
           </a:p>
@@ -5151,7 +5151,7 @@
             <a:fld id="{AA70F276-1833-4A75-9C1D-A56E2295A68D}" type="datetimeFigureOut">
               <a:rPr lang="en-US" smtClean="0"/>
               <a:pPr/>
-              <a:t>10/13/21</a:t>
+              <a:t>10/17/2022</a:t>
             </a:fld>
             <a:endParaRPr lang="en-US" dirty="0"/>
           </a:p>
@@ -5582,7 +5582,7 @@
             <a:fld id="{AA70F276-1833-4A75-9C1D-A56E2295A68D}" type="datetimeFigureOut">
               <a:rPr lang="en-US" smtClean="0"/>
               <a:pPr/>
-              <a:t>10/13/21</a:t>
+              <a:t>10/17/2022</a:t>
             </a:fld>
             <a:endParaRPr lang="en-US" dirty="0"/>
           </a:p>
@@ -24304,6 +24304,56 @@
           </a:prstGeom>
         </p:spPr>
       </p:pic>
+      <p:sp>
+        <p:nvSpPr>
+          <p:cNvPr id="5" name="TextBox 4">
+            <a:extLst>
+              <a:ext uri="{FF2B5EF4-FFF2-40B4-BE49-F238E27FC236}">
+                <a16:creationId xmlns:a16="http://schemas.microsoft.com/office/drawing/2014/main" id="{96CEE921-1A18-FDC6-7FDC-84C6F7C46FC8}"/>
+              </a:ext>
+            </a:extLst>
+          </p:cNvPr>
+          <p:cNvSpPr txBox="1"/>
+          <p:nvPr/>
+        </p:nvSpPr>
+        <p:spPr>
+          <a:xfrm>
+            <a:off x="5882326" y="2960016"/>
+            <a:ext cx="3346515" cy="646331"/>
+          </a:xfrm>
+          <a:prstGeom prst="rect">
+            <a:avLst/>
+          </a:prstGeom>
+          <a:noFill/>
+        </p:spPr>
+        <p:txBody>
+          <a:bodyPr wrap="square" rtlCol="0">
+            <a:spAutoFit/>
+          </a:bodyPr>
+          <a:lstStyle/>
+          <a:p>
+            <a:r>
+              <a:rPr lang="en-SG" dirty="0" err="1"/>
+              <a:t>a+b</a:t>
+            </a:r>
+            <a:r>
+              <a:rPr lang="en-SG" dirty="0"/>
+              <a:t> = ((2+4)+(-4+5)</a:t>
+            </a:r>
+            <a:r>
+              <a:rPr lang="en-GB" dirty="0"/>
+              <a:t>)</a:t>
+            </a:r>
+          </a:p>
+          <a:p>
+            <a:r>
+              <a:rPr lang="en-GB" dirty="0"/>
+              <a:t>	= (6,1)</a:t>
+            </a:r>
+            <a:endParaRPr lang="en-SG" dirty="0"/>
+          </a:p>
+        </p:txBody>
+      </p:sp>
     </p:spTree>
     <p:extLst>
       <p:ext uri="{BB962C8B-B14F-4D97-AF65-F5344CB8AC3E}">
@@ -24589,6 +24639,63 @@
           </a:prstGeom>
         </p:spPr>
       </p:pic>
+      <p:sp>
+        <p:nvSpPr>
+          <p:cNvPr id="5" name="TextBox 4">
+            <a:extLst>
+              <a:ext uri="{FF2B5EF4-FFF2-40B4-BE49-F238E27FC236}">
+                <a16:creationId xmlns:a16="http://schemas.microsoft.com/office/drawing/2014/main" id="{78536BDD-8869-A9E0-DA55-04631A459613}"/>
+              </a:ext>
+            </a:extLst>
+          </p:cNvPr>
+          <p:cNvSpPr txBox="1"/>
+          <p:nvPr/>
+        </p:nvSpPr>
+        <p:spPr>
+          <a:xfrm>
+            <a:off x="6268825" y="2569106"/>
+            <a:ext cx="3996965" cy="1477328"/>
+          </a:xfrm>
+          <a:prstGeom prst="rect">
+            <a:avLst/>
+          </a:prstGeom>
+          <a:noFill/>
+        </p:spPr>
+        <p:txBody>
+          <a:bodyPr wrap="square" rtlCol="0">
+            <a:spAutoFit/>
+          </a:bodyPr>
+          <a:lstStyle/>
+          <a:p>
+            <a:r>
+              <a:rPr lang="en-SG" dirty="0"/>
+              <a:t>a=(2,-4)</a:t>
+            </a:r>
+          </a:p>
+          <a:p>
+            <a:r>
+              <a:rPr lang="en-SG" dirty="0"/>
+              <a:t>b=(4,5)</a:t>
+            </a:r>
+          </a:p>
+          <a:p>
+            <a:endParaRPr lang="en-SG" dirty="0"/>
+          </a:p>
+          <a:p>
+            <a:r>
+              <a:rPr lang="en-SG" dirty="0"/>
+              <a:t>a-b=((2-4),(-4-5))</a:t>
+            </a:r>
+          </a:p>
+          <a:p>
+            <a:r>
+              <a:rPr lang="en-SG" dirty="0"/>
+              <a:t>	=(-2,-9)</a:t>
+            </a:r>
+            <a:endParaRPr lang="en-GB" dirty="0"/>
+          </a:p>
+        </p:txBody>
+      </p:sp>
     </p:spTree>
     <p:extLst>
       <p:ext uri="{BB962C8B-B14F-4D97-AF65-F5344CB8AC3E}">
@@ -24872,6 +24979,58 @@
               <a:t>a.b</a:t>
             </a:r>
             <a:endParaRPr lang="en-US" dirty="0"/>
+          </a:p>
+        </p:txBody>
+      </p:sp>
+      <p:sp>
+        <p:nvSpPr>
+          <p:cNvPr id="4" name="TextBox 3">
+            <a:extLst>
+              <a:ext uri="{FF2B5EF4-FFF2-40B4-BE49-F238E27FC236}">
+                <a16:creationId xmlns:a16="http://schemas.microsoft.com/office/drawing/2014/main" id="{3F390D99-4E8C-B24B-62AD-EF5BBD6B585C}"/>
+              </a:ext>
+            </a:extLst>
+          </p:cNvPr>
+          <p:cNvSpPr txBox="1"/>
+          <p:nvPr/>
+        </p:nvSpPr>
+        <p:spPr>
+          <a:xfrm>
+            <a:off x="1932495" y="3176833"/>
+            <a:ext cx="3648173" cy="923330"/>
+          </a:xfrm>
+          <a:prstGeom prst="rect">
+            <a:avLst/>
+          </a:prstGeom>
+          <a:noFill/>
+        </p:spPr>
+        <p:txBody>
+          <a:bodyPr wrap="square" rtlCol="0">
+            <a:spAutoFit/>
+          </a:bodyPr>
+          <a:lstStyle/>
+          <a:p>
+            <a:r>
+              <a:rPr lang="en-SG" dirty="0" err="1"/>
+              <a:t>a.b</a:t>
+            </a:r>
+            <a:r>
+              <a:rPr lang="en-SG" dirty="0"/>
+              <a:t> = (3*-2)+ (4*1)+(-1*2)</a:t>
+            </a:r>
+          </a:p>
+          <a:p>
+            <a:r>
+              <a:rPr lang="en-SG" dirty="0"/>
+              <a:t>	= -6+4-2</a:t>
+            </a:r>
+          </a:p>
+          <a:p>
+            <a:r>
+              <a:rPr lang="en-SG" dirty="0"/>
+              <a:t>	= -4</a:t>
+            </a:r>
+            <a:endParaRPr lang="en-GB" dirty="0"/>
           </a:p>
         </p:txBody>
       </p:sp>
@@ -26039,7 +26198,11 @@
               <a:buAutoNum type="alphaLcPeriod"/>
             </a:pPr>
             <a:r>
-              <a:rPr lang="en-US" dirty="0"/>
+              <a:rPr lang="en-US" dirty="0">
+                <a:highlight>
+                  <a:srgbClr val="800080"/>
+                </a:highlight>
+              </a:rPr>
               <a:t>When angle is (2n-1)𝝿</a:t>
             </a:r>
           </a:p>
@@ -26824,6 +26987,106 @@
           </a:p>
         </p:txBody>
       </p:sp>
+      <p:sp>
+        <p:nvSpPr>
+          <p:cNvPr id="4" name="TextBox 3">
+            <a:extLst>
+              <a:ext uri="{FF2B5EF4-FFF2-40B4-BE49-F238E27FC236}">
+                <a16:creationId xmlns:a16="http://schemas.microsoft.com/office/drawing/2014/main" id="{497A2641-79CE-C7A5-7F09-FDA0E216111A}"/>
+              </a:ext>
+            </a:extLst>
+          </p:cNvPr>
+          <p:cNvSpPr txBox="1"/>
+          <p:nvPr/>
+        </p:nvSpPr>
+        <p:spPr>
+          <a:xfrm>
+            <a:off x="1366887" y="3289955"/>
+            <a:ext cx="4729113" cy="2031325"/>
+          </a:xfrm>
+          <a:prstGeom prst="rect">
+            <a:avLst/>
+          </a:prstGeom>
+          <a:noFill/>
+        </p:spPr>
+        <p:txBody>
+          <a:bodyPr wrap="square" rtlCol="0">
+            <a:spAutoFit/>
+          </a:bodyPr>
+          <a:lstStyle/>
+          <a:p>
+            <a:r>
+              <a:rPr lang="en-SG" dirty="0"/>
+              <a:t>c</a:t>
+            </a:r>
+            <a:r>
+              <a:rPr lang="en-SG" baseline="-25000" dirty="0"/>
+              <a:t>x</a:t>
+            </a:r>
+            <a:r>
+              <a:rPr lang="en-SG" dirty="0"/>
+              <a:t>   = (4*2)-(-1*1)</a:t>
+            </a:r>
+          </a:p>
+          <a:p>
+            <a:r>
+              <a:rPr lang="en-SG" dirty="0"/>
+              <a:t>	= 9</a:t>
+            </a:r>
+          </a:p>
+          <a:p>
+            <a:r>
+              <a:rPr lang="en-SG" dirty="0"/>
+              <a:t>c</a:t>
+            </a:r>
+            <a:r>
+              <a:rPr lang="en-SG" baseline="-25000" dirty="0"/>
+              <a:t>y</a:t>
+            </a:r>
+            <a:r>
+              <a:rPr lang="en-SG" dirty="0"/>
+              <a:t>   = (-1*-2)-(3*2)</a:t>
+            </a:r>
+          </a:p>
+          <a:p>
+            <a:r>
+              <a:rPr lang="en-SG" dirty="0"/>
+              <a:t>	= -4</a:t>
+            </a:r>
+          </a:p>
+          <a:p>
+            <a:r>
+              <a:rPr lang="en-SG" dirty="0" err="1"/>
+              <a:t>c</a:t>
+            </a:r>
+            <a:r>
+              <a:rPr lang="en-SG" baseline="-25000" dirty="0" err="1"/>
+              <a:t>z</a:t>
+            </a:r>
+            <a:r>
+              <a:rPr lang="en-SG" baseline="-25000" dirty="0"/>
+              <a:t> </a:t>
+            </a:r>
+            <a:r>
+              <a:rPr lang="en-SG" dirty="0"/>
+              <a:t>	= (3*1)-(4*-2)</a:t>
+            </a:r>
+          </a:p>
+          <a:p>
+            <a:r>
+              <a:rPr lang="en-SG" dirty="0"/>
+              <a:t>	= 11</a:t>
+            </a:r>
+          </a:p>
+          <a:p>
+            <a:r>
+              <a:rPr lang="en-SG" dirty="0"/>
+              <a:t>a x b = (9,-4,11)</a:t>
+            </a:r>
+            <a:endParaRPr lang="en-GB" dirty="0"/>
+          </a:p>
+        </p:txBody>
+      </p:sp>
     </p:spTree>
     <p:extLst>
       <p:ext uri="{BB962C8B-B14F-4D97-AF65-F5344CB8AC3E}">
@@ -26962,6 +27225,259 @@
               <a:t>?</a:t>
             </a:r>
             <a:endParaRPr lang="en-US" dirty="0"/>
+          </a:p>
+        </p:txBody>
+      </p:sp>
+      <p:sp>
+        <p:nvSpPr>
+          <p:cNvPr id="4" name="TextBox 3">
+            <a:extLst>
+              <a:ext uri="{FF2B5EF4-FFF2-40B4-BE49-F238E27FC236}">
+                <a16:creationId xmlns:a16="http://schemas.microsoft.com/office/drawing/2014/main" id="{1AFB68D4-58CD-E455-872F-C1068E39A2C8}"/>
+              </a:ext>
+            </a:extLst>
+          </p:cNvPr>
+          <p:cNvSpPr txBox="1"/>
+          <p:nvPr/>
+        </p:nvSpPr>
+        <p:spPr>
+          <a:xfrm>
+            <a:off x="1762812" y="3271101"/>
+            <a:ext cx="5260157" cy="2585323"/>
+          </a:xfrm>
+          <a:prstGeom prst="rect">
+            <a:avLst/>
+          </a:prstGeom>
+          <a:noFill/>
+        </p:spPr>
+        <p:txBody>
+          <a:bodyPr wrap="square" rtlCol="0">
+            <a:spAutoFit/>
+          </a:bodyPr>
+          <a:lstStyle/>
+          <a:p>
+            <a:pPr lvl="1"/>
+            <a:r>
+              <a:rPr lang="en-SG" dirty="0"/>
+              <a:t>c</a:t>
+            </a:r>
+            <a:r>
+              <a:rPr lang="en-SG" baseline="-25000" dirty="0"/>
+              <a:t>x</a:t>
+            </a:r>
+            <a:r>
+              <a:rPr lang="en-SG" dirty="0"/>
+              <a:t> = </a:t>
+            </a:r>
+            <a:r>
+              <a:rPr lang="en-SG" dirty="0" err="1"/>
+              <a:t>a</a:t>
+            </a:r>
+            <a:r>
+              <a:rPr lang="en-SG" baseline="-25000" dirty="0" err="1"/>
+              <a:t>y</a:t>
+            </a:r>
+            <a:r>
+              <a:rPr lang="en-SG" dirty="0" err="1"/>
+              <a:t>b</a:t>
+            </a:r>
+            <a:r>
+              <a:rPr lang="en-SG" baseline="-25000" dirty="0" err="1"/>
+              <a:t>z</a:t>
+            </a:r>
+            <a:r>
+              <a:rPr lang="en-SG" dirty="0"/>
+              <a:t> − </a:t>
+            </a:r>
+            <a:r>
+              <a:rPr lang="en-SG" dirty="0" err="1"/>
+              <a:t>a</a:t>
+            </a:r>
+            <a:r>
+              <a:rPr lang="en-SG" baseline="-25000" dirty="0" err="1"/>
+              <a:t>z</a:t>
+            </a:r>
+            <a:r>
+              <a:rPr lang="en-SG" dirty="0" err="1"/>
+              <a:t>b</a:t>
+            </a:r>
+            <a:r>
+              <a:rPr lang="en-SG" baseline="-25000" dirty="0" err="1"/>
+              <a:t>y</a:t>
+            </a:r>
+            <a:r>
+              <a:rPr lang="en-SG" dirty="0"/>
+              <a:t> = (1*1)-(1*1) = 0</a:t>
+            </a:r>
+          </a:p>
+          <a:p>
+            <a:pPr lvl="1"/>
+            <a:r>
+              <a:rPr lang="en-SG" dirty="0"/>
+              <a:t>c</a:t>
+            </a:r>
+            <a:r>
+              <a:rPr lang="en-SG" baseline="-25000" dirty="0"/>
+              <a:t>y</a:t>
+            </a:r>
+            <a:r>
+              <a:rPr lang="en-SG" dirty="0"/>
+              <a:t> = </a:t>
+            </a:r>
+            <a:r>
+              <a:rPr lang="en-SG" dirty="0" err="1"/>
+              <a:t>a</a:t>
+            </a:r>
+            <a:r>
+              <a:rPr lang="en-SG" baseline="-25000" dirty="0" err="1"/>
+              <a:t>z</a:t>
+            </a:r>
+            <a:r>
+              <a:rPr lang="en-SG" dirty="0" err="1"/>
+              <a:t>b</a:t>
+            </a:r>
+            <a:r>
+              <a:rPr lang="en-SG" baseline="-25000" dirty="0" err="1"/>
+              <a:t>x</a:t>
+            </a:r>
+            <a:r>
+              <a:rPr lang="en-SG" dirty="0"/>
+              <a:t> − </a:t>
+            </a:r>
+            <a:r>
+              <a:rPr lang="en-SG" dirty="0" err="1"/>
+              <a:t>a</a:t>
+            </a:r>
+            <a:r>
+              <a:rPr lang="en-SG" baseline="-25000" dirty="0" err="1"/>
+              <a:t>x</a:t>
+            </a:r>
+            <a:r>
+              <a:rPr lang="en-SG" dirty="0" err="1"/>
+              <a:t>b</a:t>
+            </a:r>
+            <a:r>
+              <a:rPr lang="en-SG" baseline="-25000" dirty="0" err="1"/>
+              <a:t>z</a:t>
+            </a:r>
+            <a:r>
+              <a:rPr lang="en-SG" dirty="0"/>
+              <a:t> = (1*2) − (-2*1) = 4</a:t>
+            </a:r>
+          </a:p>
+          <a:p>
+            <a:pPr lvl="1"/>
+            <a:r>
+              <a:rPr lang="en-SG" dirty="0" err="1"/>
+              <a:t>c</a:t>
+            </a:r>
+            <a:r>
+              <a:rPr lang="en-SG" baseline="-25000" dirty="0" err="1"/>
+              <a:t>z</a:t>
+            </a:r>
+            <a:r>
+              <a:rPr lang="en-SG" dirty="0"/>
+              <a:t> = </a:t>
+            </a:r>
+            <a:r>
+              <a:rPr lang="en-SG" dirty="0" err="1"/>
+              <a:t>a</a:t>
+            </a:r>
+            <a:r>
+              <a:rPr lang="en-SG" baseline="-25000" dirty="0" err="1"/>
+              <a:t>x</a:t>
+            </a:r>
+            <a:r>
+              <a:rPr lang="en-SG" dirty="0" err="1"/>
+              <a:t>b</a:t>
+            </a:r>
+            <a:r>
+              <a:rPr lang="en-SG" baseline="-25000" dirty="0" err="1"/>
+              <a:t>y</a:t>
+            </a:r>
+            <a:r>
+              <a:rPr lang="en-SG" dirty="0"/>
+              <a:t> − </a:t>
+            </a:r>
+            <a:r>
+              <a:rPr lang="en-SG" dirty="0" err="1"/>
+              <a:t>a</a:t>
+            </a:r>
+            <a:r>
+              <a:rPr lang="en-SG" baseline="-25000" dirty="0" err="1"/>
+              <a:t>y</a:t>
+            </a:r>
+            <a:r>
+              <a:rPr lang="en-SG" dirty="0" err="1"/>
+              <a:t>b</a:t>
+            </a:r>
+            <a:r>
+              <a:rPr lang="en-SG" baseline="-25000" dirty="0" err="1"/>
+              <a:t>x</a:t>
+            </a:r>
+            <a:r>
+              <a:rPr lang="en-SG" dirty="0"/>
+              <a:t> = (-2*1) – (1*2) = -4</a:t>
+            </a:r>
+          </a:p>
+          <a:p>
+            <a:pPr lvl="1"/>
+            <a:endParaRPr lang="en-SG" dirty="0"/>
+          </a:p>
+          <a:p>
+            <a:pPr lvl="1"/>
+            <a:r>
+              <a:rPr lang="en-SG" dirty="0"/>
+              <a:t>c = (0,4,-4)</a:t>
+            </a:r>
+          </a:p>
+          <a:p>
+            <a:pPr lvl="1"/>
+            <a:r>
+              <a:rPr lang="en-SG" dirty="0"/>
+              <a:t>|c| = sqrt(0</a:t>
+            </a:r>
+            <a:r>
+              <a:rPr lang="en-SG" baseline="30000" dirty="0"/>
+              <a:t>2</a:t>
+            </a:r>
+            <a:r>
+              <a:rPr lang="en-SG" dirty="0"/>
+              <a:t>+4</a:t>
+            </a:r>
+            <a:r>
+              <a:rPr lang="en-SG" baseline="30000" dirty="0"/>
+              <a:t>2</a:t>
+            </a:r>
+            <a:r>
+              <a:rPr lang="en-SG" dirty="0"/>
+              <a:t>+(-4</a:t>
+            </a:r>
+            <a:r>
+              <a:rPr lang="en-SG" baseline="30000" dirty="0"/>
+              <a:t>2</a:t>
+            </a:r>
+            <a:r>
+              <a:rPr lang="en-SG" dirty="0"/>
+              <a:t>))</a:t>
+            </a:r>
+          </a:p>
+          <a:p>
+            <a:pPr lvl="1"/>
+            <a:r>
+              <a:rPr lang="en-SG" dirty="0"/>
+              <a:t>	= sqrt(16 + (-16))</a:t>
+            </a:r>
+          </a:p>
+          <a:p>
+            <a:pPr lvl="1"/>
+            <a:r>
+              <a:rPr lang="en-SG" dirty="0"/>
+              <a:t>	= sqrt(0)</a:t>
+            </a:r>
+          </a:p>
+          <a:p>
+            <a:endParaRPr lang="en-GB" dirty="0"/>
           </a:p>
         </p:txBody>
       </p:sp>
@@ -27376,11 +27892,101 @@
             </a:r>
             <a:r>
               <a:rPr lang="en-SG" dirty="0"/>
-              <a:t> ?</a:t>
+              <a:t> ? (leave answer in form of n)</a:t>
             </a:r>
           </a:p>
           <a:p>
-            <a:endParaRPr lang="en-US" dirty="0"/>
+            <a:pPr marL="0" indent="0">
+              <a:buNone/>
+            </a:pPr>
+            <a:r>
+              <a:rPr lang="en-SG" b="1" dirty="0"/>
+              <a:t>	a × b</a:t>
+            </a:r>
+            <a:r>
+              <a:rPr lang="en-SG" dirty="0"/>
+              <a:t> 	= |</a:t>
+            </a:r>
+            <a:r>
+              <a:rPr lang="en-SG" b="1" dirty="0"/>
+              <a:t>a</a:t>
+            </a:r>
+            <a:r>
+              <a:rPr lang="en-SG" dirty="0"/>
+              <a:t>| |</a:t>
+            </a:r>
+            <a:r>
+              <a:rPr lang="en-SG" b="1" dirty="0"/>
+              <a:t>b</a:t>
+            </a:r>
+            <a:r>
+              <a:rPr lang="en-SG" dirty="0"/>
+              <a:t>| sin(</a:t>
+            </a:r>
+            <a:r>
+              <a:rPr lang="el-GR" dirty="0"/>
+              <a:t>θ) </a:t>
+            </a:r>
+            <a:r>
+              <a:rPr lang="en-SG" b="1" dirty="0"/>
+              <a:t>n</a:t>
+            </a:r>
+          </a:p>
+          <a:p>
+            <a:pPr marL="0" indent="0">
+              <a:buNone/>
+            </a:pPr>
+            <a:r>
+              <a:rPr lang="en-SG" b="1" dirty="0"/>
+              <a:t>			= 3 * 4 sin(30</a:t>
+            </a:r>
+            <a:r>
+              <a:rPr lang="en-SG" b="1" baseline="30000" dirty="0"/>
+              <a:t>o</a:t>
+            </a:r>
+            <a:r>
+              <a:rPr lang="en-US" dirty="0"/>
+              <a:t>) n </a:t>
+            </a:r>
+            <a:r>
+              <a:rPr lang="en-US"/>
+              <a:t>			</a:t>
+            </a:r>
+            <a:r>
+              <a:rPr lang="en-SG" sz="1400" b="1"/>
+              <a:t>sin</a:t>
+            </a:r>
+            <a:r>
+              <a:rPr lang="en-SG" sz="1400" b="1" dirty="0"/>
+              <a:t>(30</a:t>
+            </a:r>
+            <a:r>
+              <a:rPr lang="en-SG" sz="1400" b="1" baseline="30000" dirty="0"/>
+              <a:t>o</a:t>
+            </a:r>
+            <a:r>
+              <a:rPr lang="en-US" sz="1400" dirty="0"/>
+              <a:t>) = 0.5(note in degree not radian)</a:t>
+            </a:r>
+          </a:p>
+          <a:p>
+            <a:pPr marL="0" indent="0">
+              <a:buNone/>
+            </a:pPr>
+            <a:r>
+              <a:rPr lang="en-US" b="1" dirty="0"/>
+              <a:t>			= 12 * 0.5n</a:t>
+            </a:r>
+          </a:p>
+          <a:p>
+            <a:pPr marL="0" indent="0">
+              <a:buNone/>
+            </a:pPr>
+            <a:r>
+              <a:rPr lang="en-US" b="1" dirty="0"/>
+              <a:t>			= 6n</a:t>
+            </a:r>
+            <a:endParaRPr lang="en-SG" b="1" dirty="0"/>
           </a:p>
         </p:txBody>
       </p:sp>

</xml_diff>